<commit_message>
Re-created profile controller.rb to allow website to run, refactor later.
</commit_message>
<xml_diff>
--- a/planning/Presentation1.pptx
+++ b/planning/Presentation1.pptx
@@ -297,7 +297,7 @@
           <a:p>
             <a:fld id="{17438118-209B-8F4A-A410-7F0E937CBB60}" type="datetimeFigureOut">
               <a:rPr lang="en-US" smtClean="0"/>
-              <a:t>26/10/17</a:t>
+              <a:t>27/10/17</a:t>
             </a:fld>
             <a:endParaRPr lang="en-US"/>
           </a:p>
@@ -467,7 +467,7 @@
           <a:p>
             <a:fld id="{17438118-209B-8F4A-A410-7F0E937CBB60}" type="datetimeFigureOut">
               <a:rPr lang="en-US" smtClean="0"/>
-              <a:t>26/10/17</a:t>
+              <a:t>27/10/17</a:t>
             </a:fld>
             <a:endParaRPr lang="en-US"/>
           </a:p>
@@ -647,7 +647,7 @@
           <a:p>
             <a:fld id="{17438118-209B-8F4A-A410-7F0E937CBB60}" type="datetimeFigureOut">
               <a:rPr lang="en-US" smtClean="0"/>
-              <a:t>26/10/17</a:t>
+              <a:t>27/10/17</a:t>
             </a:fld>
             <a:endParaRPr lang="en-US"/>
           </a:p>
@@ -817,7 +817,7 @@
           <a:p>
             <a:fld id="{17438118-209B-8F4A-A410-7F0E937CBB60}" type="datetimeFigureOut">
               <a:rPr lang="en-US" smtClean="0"/>
-              <a:t>26/10/17</a:t>
+              <a:t>27/10/17</a:t>
             </a:fld>
             <a:endParaRPr lang="en-US"/>
           </a:p>
@@ -1063,7 +1063,7 @@
           <a:p>
             <a:fld id="{17438118-209B-8F4A-A410-7F0E937CBB60}" type="datetimeFigureOut">
               <a:rPr lang="en-US" smtClean="0"/>
-              <a:t>26/10/17</a:t>
+              <a:t>27/10/17</a:t>
             </a:fld>
             <a:endParaRPr lang="en-US"/>
           </a:p>
@@ -1351,7 +1351,7 @@
           <a:p>
             <a:fld id="{17438118-209B-8F4A-A410-7F0E937CBB60}" type="datetimeFigureOut">
               <a:rPr lang="en-US" smtClean="0"/>
-              <a:t>26/10/17</a:t>
+              <a:t>27/10/17</a:t>
             </a:fld>
             <a:endParaRPr lang="en-US"/>
           </a:p>
@@ -1773,7 +1773,7 @@
           <a:p>
             <a:fld id="{17438118-209B-8F4A-A410-7F0E937CBB60}" type="datetimeFigureOut">
               <a:rPr lang="en-US" smtClean="0"/>
-              <a:t>26/10/17</a:t>
+              <a:t>27/10/17</a:t>
             </a:fld>
             <a:endParaRPr lang="en-US"/>
           </a:p>
@@ -1891,7 +1891,7 @@
           <a:p>
             <a:fld id="{17438118-209B-8F4A-A410-7F0E937CBB60}" type="datetimeFigureOut">
               <a:rPr lang="en-US" smtClean="0"/>
-              <a:t>26/10/17</a:t>
+              <a:t>27/10/17</a:t>
             </a:fld>
             <a:endParaRPr lang="en-US"/>
           </a:p>
@@ -1986,7 +1986,7 @@
           <a:p>
             <a:fld id="{17438118-209B-8F4A-A410-7F0E937CBB60}" type="datetimeFigureOut">
               <a:rPr lang="en-US" smtClean="0"/>
-              <a:t>26/10/17</a:t>
+              <a:t>27/10/17</a:t>
             </a:fld>
             <a:endParaRPr lang="en-US"/>
           </a:p>
@@ -2263,7 +2263,7 @@
           <a:p>
             <a:fld id="{17438118-209B-8F4A-A410-7F0E937CBB60}" type="datetimeFigureOut">
               <a:rPr lang="en-US" smtClean="0"/>
-              <a:t>26/10/17</a:t>
+              <a:t>27/10/17</a:t>
             </a:fld>
             <a:endParaRPr lang="en-US"/>
           </a:p>
@@ -2516,7 +2516,7 @@
           <a:p>
             <a:fld id="{17438118-209B-8F4A-A410-7F0E937CBB60}" type="datetimeFigureOut">
               <a:rPr lang="en-US" smtClean="0"/>
-              <a:t>26/10/17</a:t>
+              <a:t>27/10/17</a:t>
             </a:fld>
             <a:endParaRPr lang="en-US"/>
           </a:p>
@@ -2729,7 +2729,7 @@
           <a:p>
             <a:fld id="{17438118-209B-8F4A-A410-7F0E937CBB60}" type="datetimeFigureOut">
               <a:rPr lang="en-US" smtClean="0"/>
-              <a:t>26/10/17</a:t>
+              <a:t>27/10/17</a:t>
             </a:fld>
             <a:endParaRPr lang="en-US"/>
           </a:p>
@@ -3114,7 +3114,12 @@
             <p:ph type="ctrTitle"/>
           </p:nvPr>
         </p:nvSpPr>
-        <p:spPr/>
+        <p:spPr>
+          <a:xfrm>
+            <a:off x="685800" y="480469"/>
+            <a:ext cx="7772400" cy="1470025"/>
+          </a:xfrm>
+        </p:spPr>
         <p:txBody>
           <a:bodyPr/>
           <a:lstStyle/>
@@ -3139,7 +3144,7 @@
         </p:nvSpPr>
         <p:spPr>
           <a:xfrm>
-            <a:off x="1692077" y="3886200"/>
+            <a:off x="1451215" y="1670663"/>
             <a:ext cx="6400800" cy="1752600"/>
           </a:xfrm>
         </p:spPr>
@@ -3189,8 +3194,8 @@
         </p:blipFill>
         <p:spPr>
           <a:xfrm>
-            <a:off x="0" y="3418614"/>
-            <a:ext cx="3413869" cy="3418614"/>
+            <a:off x="2320348" y="2197513"/>
+            <a:ext cx="4298748" cy="4304723"/>
           </a:xfrm>
           <a:prstGeom prst="rect">
             <a:avLst/>
@@ -3516,7 +3521,6 @@
               <a:rPr lang="en-US" dirty="0" smtClean="0"/>
               <a:t>Challenges</a:t>
             </a:r>
-            <a:endParaRPr lang="en-US" dirty="0" smtClean="0"/>
           </a:p>
           <a:p>
             <a:r>
@@ -4759,6 +4763,13 @@
   <p:clrMapOvr>
     <a:masterClrMapping/>
   </p:clrMapOvr>
+  <p:timing>
+    <p:tnLst>
+      <p:par>
+        <p:cTn xmlns:p14="http://schemas.microsoft.com/office/powerpoint/2010/main" id="1" dur="indefinite" restart="never" nodeType="tmRoot"/>
+      </p:par>
+    </p:tnLst>
+  </p:timing>
 </p:sld>
 </file>
 

</xml_diff>